<commit_message>
.dat fájl és diagram létrehozása a dat fájlból
</commit_message>
<xml_diff>
--- a/Report/example_output.pptx
+++ b/Report/example_output.pptx
@@ -109,6 +109,144 @@
     </a:lvl9pPr>
   </p:defaultTextStyle>
 </p:presentation>
+</file>
+
+<file path=ppt/charts/chart1.xml><?xml version="1.0" encoding="utf-8"?>
+<c:chartSpace xmlns:c="http://schemas.openxmlformats.org/drawingml/2006/chart" xmlns:a="http://schemas.openxmlformats.org/drawingml/2006/main" xmlns:r="http://schemas.openxmlformats.org/officeDocument/2006/relationships">
+  <c:date1904 val="0"/>
+  <c:chart>
+    <c:autoTitleDeleted val="0"/>
+    <c:plotArea>
+      <c:lineChart>
+        <c:grouping val="standard"/>
+        <c:varyColors val="0"/>
+        <c:ser>
+          <c:idx val="0"/>
+          <c:order val="0"/>
+          <c:tx>
+            <c:strRef>
+              <c:f>Sheet1!$B$1</c:f>
+              <c:strCache>
+                <c:ptCount val="1"/>
+                <c:pt idx="0">
+                  <c:v>Series 1</c:v>
+                </c:pt>
+              </c:strCache>
+            </c:strRef>
+          </c:tx>
+          <c:marker>
+            <c:symbol val="none"/>
+          </c:marker>
+          <c:cat>
+            <c:numRef>
+              <c:f>Sheet1!$A$2:$A$5</c:f>
+              <c:numCache>
+                <c:formatCode>General</c:formatCode>
+                <c:ptCount val="4"/>
+                <c:pt idx="0">
+                  <c:v>2</c:v>
+                </c:pt>
+                <c:pt idx="1">
+                  <c:v>3</c:v>
+                </c:pt>
+                <c:pt idx="2">
+                  <c:v>4</c:v>
+                </c:pt>
+                <c:pt idx="3">
+                  <c:v>5</c:v>
+                </c:pt>
+              </c:numCache>
+            </c:numRef>
+          </c:cat>
+          <c:val>
+            <c:numRef>
+              <c:f>Sheet1!$B$2:$B$5</c:f>
+              <c:numCache>
+                <c:formatCode>General</c:formatCode>
+                <c:ptCount val="4"/>
+                <c:pt idx="0">
+                  <c:v>20</c:v>
+                </c:pt>
+                <c:pt idx="1">
+                  <c:v>30</c:v>
+                </c:pt>
+                <c:pt idx="2">
+                  <c:v>40</c:v>
+                </c:pt>
+                <c:pt idx="3">
+                  <c:v>50</c:v>
+                </c:pt>
+              </c:numCache>
+            </c:numRef>
+          </c:val>
+          <c:smooth val="0"/>
+        </c:ser>
+        <c:marker val="1"/>
+        <c:smooth val="0"/>
+        <c:axId val="2118791784"/>
+        <c:axId val="2140495176"/>
+      </c:lineChart>
+      <c:catAx>
+        <c:axId val="2118791784"/>
+        <c:scaling>
+          <c:orientation val="minMax"/>
+        </c:scaling>
+        <c:delete val="0"/>
+        <c:axPos val="b"/>
+        <c:title>
+          <c:layout/>
+          <c:overlay val="0"/>
+        </c:title>
+        <c:majorTickMark val="out"/>
+        <c:minorTickMark val="none"/>
+        <c:tickLblPos val="nextTo"/>
+        <c:crossAx val="2140495176"/>
+        <c:crosses val="autoZero"/>
+        <c:auto val="1"/>
+        <c:lblAlgn val="ctr"/>
+        <c:lblOffset val="100"/>
+        <c:noMultiLvlLbl val="0"/>
+      </c:catAx>
+      <c:valAx>
+        <c:axId val="2140495176"/>
+        <c:scaling/>
+        <c:delete val="0"/>
+        <c:axPos val="l"/>
+        <c:majorGridlines/>
+        <c:title>
+          <c:layout/>
+          <c:overlay val="0"/>
+        </c:title>
+        <c:majorTickMark val="out"/>
+        <c:minorTickMark val="none"/>
+        <c:tickLblPos val="nextTo"/>
+        <c:crossAx val="2118791784"/>
+        <c:crosses val="autoZero"/>
+      </c:valAx>
+    </c:plotArea>
+    <c:legend>
+      <c:legendPos val="r"/>
+      <c:layout/>
+      <c:overlay val="0"/>
+    </c:legend>
+    <c:plotVisOnly val="1"/>
+    <c:dispBlanksAs val="gap"/>
+    <c:showDLblsOverMax val="0"/>
+  </c:chart>
+  <c:txPr>
+    <a:bodyPr/>
+    <a:lstStyle/>
+    <a:p>
+      <a:pPr>
+        <a:defRPr sz="1800"/>
+      </a:pPr>
+      <a:endParaRPr lang="en-US"/>
+    </a:p>
+  </c:txPr>
+  <c:externalData r:id="rId1">
+    <c:autoUpdate val="0"/>
+  </c:externalData>
+</c:chartSpace>
 </file>
 
 <file path=ppt/slideLayouts/slideLayout1.xml><?xml version="1.0" encoding="utf-8"?>
@@ -3372,6 +3510,24 @@
           </a:p>
         </p:txBody>
       </p:sp>
+      <p:graphicFrame>
+        <p:nvGraphicFramePr>
+          <p:cNvPr id="3" name="Chart 2"/>
+          <p:cNvGraphicFramePr>
+            <a:graphicFrameLocks noGrp="1"/>
+          </p:cNvGraphicFramePr>
+          <p:nvPr/>
+        </p:nvGraphicFramePr>
+        <p:xfrm>
+          <a:off x="1828800" y="1828800"/>
+          <a:ext cx="5486400" cy="4114800"/>
+        </p:xfrm>
+        <a:graphic>
+          <a:graphicData uri="http://schemas.openxmlformats.org/drawingml/2006/chart">
+            <c:chart xmlns:c="http://schemas.openxmlformats.org/drawingml/2006/chart" r:id="rId2"/>
+          </a:graphicData>
+        </a:graphic>
+      </p:graphicFrame>
     </p:spTree>
   </p:cSld>
   <p:clrMapOvr>

</xml_diff>